<commit_message>
Fixed title slides for proj3 lab
</commit_message>
<xml_diff>
--- a/data8/slides/sp20_lab_proj3.pptx
+++ b/data8/slides/sp20_lab_proj3.pptx
@@ -7654,13 +7654,25 @@
                 </a:solidFill>
                 <a:latin typeface="Avenir LT Std 45 Book" pitchFamily="34" charset="0"/>
               </a:rPr>
-              <a:t>Data 8, Lab </a:t>
-            </a:r>
-            <a:r>
-              <a:rPr lang="en-US" dirty="0">
+              <a:t>Data 8</a:t>
+            </a:r>
+            <a:r>
+              <a:rPr lang="en-US" smtClean="0">
+                <a:solidFill>
+                  <a:srgbClr val="C28220"/>
+                </a:solidFill>
                 <a:latin typeface="Avenir LT Std 45 Book" pitchFamily="34" charset="0"/>
               </a:rPr>
-              <a:t>9</a:t>
+              <a:t>, </a:t>
+            </a:r>
+            <a:r>
+              <a:rPr lang="en-US" smtClean="0">
+                <a:solidFill>
+                  <a:srgbClr val="C28220"/>
+                </a:solidFill>
+                <a:latin typeface="Avenir LT Std 45 Book" pitchFamily="34" charset="0"/>
+              </a:rPr>
+              <a:t>Project 3 Lab</a:t>
             </a:r>
             <a:endParaRPr lang="en-US" dirty="0">
               <a:solidFill>
@@ -7699,9 +7711,6 @@
               </a:rPr>
               <a:t>Residuals and Regression Inference</a:t>
             </a:r>
-            <a:endParaRPr lang="en-US" b="1" dirty="0" smtClean="0">
-              <a:latin typeface="Avenir LT Std 45 Book" pitchFamily="34" charset="0"/>
-            </a:endParaRPr>
           </a:p>
           <a:p>
             <a:endParaRPr lang="en-US" b="1" dirty="0">
@@ -7734,19 +7743,7 @@
               <a:rPr lang="en-US" dirty="0" smtClean="0">
                 <a:latin typeface="Avenir LT Std 45 Book" pitchFamily="34" charset="0"/>
               </a:rPr>
-              <a:t>24</a:t>
-            </a:r>
-            <a:r>
-              <a:rPr lang="en-US" dirty="0" smtClean="0">
-                <a:latin typeface="Avenir LT Std 45 Book" pitchFamily="34" charset="0"/>
-              </a:rPr>
-              <a:t> </a:t>
-            </a:r>
-            <a:r>
-              <a:rPr lang="en-US" dirty="0" smtClean="0">
-                <a:latin typeface="Avenir LT Std 45 Book" pitchFamily="34" charset="0"/>
-              </a:rPr>
-              <a:t>April 2020</a:t>
+              <a:t>24 April 2020</a:t>
             </a:r>
             <a:endParaRPr lang="en-US" dirty="0">
               <a:latin typeface="Avenir LT Std 45 Book" pitchFamily="34" charset="0"/>
@@ -8027,13 +8024,7 @@
               <a:rPr lang="en-CA" dirty="0" smtClean="0">
                 <a:latin typeface="+mn-lt"/>
               </a:rPr>
-              <a:t>Review: Linear </a:t>
-            </a:r>
-            <a:r>
-              <a:rPr lang="en-CA" dirty="0" smtClean="0">
-                <a:latin typeface="+mn-lt"/>
-              </a:rPr>
-              <a:t>Regression Equation</a:t>
+              <a:t>Review: Linear Regression Equation</a:t>
             </a:r>
             <a:endParaRPr lang="en-CA" dirty="0">
               <a:latin typeface="+mn-lt"/>
@@ -8468,9 +8459,6 @@
               </a:rPr>
               <a:t>Will look like formless cloud if linear regression is a good model</a:t>
             </a:r>
-            <a:endParaRPr lang="en-CA" dirty="0" smtClean="0">
-              <a:latin typeface="+mn-lt"/>
-            </a:endParaRPr>
           </a:p>
           <a:p>
             <a:r>
@@ -8901,13 +8889,7 @@
               <a:rPr lang="en-CA" dirty="0" smtClean="0">
                 <a:latin typeface="+mn-lt"/>
               </a:rPr>
-              <a:t>Watch </a:t>
-            </a:r>
-            <a:r>
-              <a:rPr lang="en-CA" dirty="0" smtClean="0">
-                <a:latin typeface="+mn-lt"/>
-              </a:rPr>
-              <a:t>year's lecture on privacy </a:t>
+              <a:t>Watch year's lecture on privacy </a:t>
             </a:r>
             <a:r>
               <a:rPr lang="en-CA" dirty="0" smtClean="0">

</xml_diff>